<commit_message>
update the components table and flow chart
</commit_message>
<xml_diff>
--- a/project/planning.pptx
+++ b/project/planning.pptx
@@ -5037,7 +5037,7 @@
           <p:nvPr>
             <p:extLst>
               <p:ext uri="{D42A27DB-BD31-4B8C-83A1-F6EECF244321}">
-                <p14:modId xmlns:p14="http://schemas.microsoft.com/office/powerpoint/2010/main" val="3400213369"/>
+                <p14:modId xmlns:p14="http://schemas.microsoft.com/office/powerpoint/2010/main" val="224368898"/>
               </p:ext>
             </p:extLst>
           </p:nvPr>
@@ -5683,8 +5683,44 @@
                           <a:ea typeface="+mn-ea"/>
                           <a:cs typeface="+mn-cs"/>
                         </a:rPr>
-                        <a:t>Placing the menu item</a:t>
-                      </a:r>
+                        <a:t>Placing the menu item,</a:t>
+                      </a:r>
+                    </a:p>
+                    <a:p>
+                      <a:pPr algn="l"/>
+                      <a:r>
+                        <a:rPr lang="en-US" sz="1200" b="0" i="0" kern="1200" dirty="0">
+                          <a:solidFill>
+                            <a:schemeClr val="dk1"/>
+                          </a:solidFill>
+                          <a:effectLst/>
+                          <a:latin typeface="+mn-lt"/>
+                          <a:ea typeface="+mn-ea"/>
+                          <a:cs typeface="+mn-cs"/>
+                        </a:rPr>
+                        <a:t>Create </a:t>
+                      </a:r>
+                      <a:r>
+                        <a:rPr lang="en-US" sz="1200" b="0" i="0" kern="1200" dirty="0" err="1">
+                          <a:solidFill>
+                            <a:schemeClr val="dk1"/>
+                          </a:solidFill>
+                          <a:effectLst/>
+                          <a:latin typeface="+mn-lt"/>
+                          <a:ea typeface="+mn-ea"/>
+                          <a:cs typeface="+mn-cs"/>
+                        </a:rPr>
+                        <a:t>userContxt</a:t>
+                      </a:r>
+                      <a:endParaRPr lang="en-US" sz="1200" b="0" i="0" kern="1200" dirty="0">
+                        <a:solidFill>
+                          <a:schemeClr val="dk1"/>
+                        </a:solidFill>
+                        <a:effectLst/>
+                        <a:latin typeface="+mn-lt"/>
+                        <a:ea typeface="+mn-ea"/>
+                        <a:cs typeface="+mn-cs"/>
+                      </a:endParaRPr>
                     </a:p>
                   </a:txBody>
                   <a:tcPr marT="45721" marB="45721"/>
@@ -6241,14 +6277,14 @@
           <p:nvPr>
             <p:extLst>
               <p:ext uri="{D42A27DB-BD31-4B8C-83A1-F6EECF244321}">
-                <p14:modId xmlns:p14="http://schemas.microsoft.com/office/powerpoint/2010/main" val="4032658231"/>
+                <p14:modId xmlns:p14="http://schemas.microsoft.com/office/powerpoint/2010/main" val="3561623104"/>
               </p:ext>
             </p:extLst>
           </p:nvPr>
         </p:nvGraphicFramePr>
         <p:xfrm>
-          <a:off x="501832" y="425998"/>
-          <a:ext cx="11188335" cy="6243636"/>
+          <a:off x="612668" y="59309"/>
+          <a:ext cx="11188335" cy="6480081"/>
         </p:xfrm>
         <a:graphic>
           <a:graphicData uri="http://schemas.openxmlformats.org/drawingml/2006/table">
@@ -6264,35 +6300,35 @@
                     </a:ext>
                   </a:extLst>
                 </a:gridCol>
-                <a:gridCol w="2185735">
+                <a:gridCol w="1727448">
                   <a:extLst>
                     <a:ext uri="{9D8B030D-6E8A-4147-A177-3AD203B41FA5}">
                       <a16:colId xmlns:a16="http://schemas.microsoft.com/office/drawing/2014/main" val="1880985765"/>
                     </a:ext>
                   </a:extLst>
                 </a:gridCol>
-                <a:gridCol w="1567543">
+                <a:gridCol w="1531620">
                   <a:extLst>
                     <a:ext uri="{9D8B030D-6E8A-4147-A177-3AD203B41FA5}">
                       <a16:colId xmlns:a16="http://schemas.microsoft.com/office/drawing/2014/main" val="3887272854"/>
                     </a:ext>
                   </a:extLst>
                 </a:gridCol>
-                <a:gridCol w="1074057">
+                <a:gridCol w="1394460">
                   <a:extLst>
                     <a:ext uri="{9D8B030D-6E8A-4147-A177-3AD203B41FA5}">
                       <a16:colId xmlns:a16="http://schemas.microsoft.com/office/drawing/2014/main" val="1989503371"/>
                     </a:ext>
                   </a:extLst>
                 </a:gridCol>
-                <a:gridCol w="1799772">
+                <a:gridCol w="1943100">
                   <a:extLst>
                     <a:ext uri="{9D8B030D-6E8A-4147-A177-3AD203B41FA5}">
                       <a16:colId xmlns:a16="http://schemas.microsoft.com/office/drawing/2014/main" val="2413159262"/>
                     </a:ext>
                   </a:extLst>
                 </a:gridCol>
-                <a:gridCol w="1560284">
+                <a:gridCol w="1590763">
                   <a:extLst>
                     <a:ext uri="{9D8B030D-6E8A-4147-A177-3AD203B41FA5}">
                       <a16:colId xmlns:a16="http://schemas.microsoft.com/office/drawing/2014/main" val="3564299130"/>
@@ -6307,7 +6343,7 @@
                   </a:extLst>
                 </a:gridCol>
               </a:tblGrid>
-              <a:tr h="592576">
+              <a:tr h="267422">
                 <a:tc>
                   <a:txBody>
                     <a:bodyPr/>
@@ -6754,7 +6790,26 @@
                       <a:pPr algn="l" rtl="0"/>
                       <a:r>
                         <a:rPr lang="en-US" sz="1200" dirty="0"/>
-                        <a:t>Show recipe details</a:t>
+                        <a:t>Show recipe details,</a:t>
+                      </a:r>
+                    </a:p>
+                    <a:p>
+                      <a:pPr algn="l" rtl="0"/>
+                      <a:r>
+                        <a:rPr lang="en-US" sz="1200" dirty="0"/>
+                        <a:t>Get the </a:t>
+                      </a:r>
+                      <a:r>
+                        <a:rPr lang="en-US" sz="1200" dirty="0" err="1"/>
+                        <a:t>recipeId</a:t>
+                      </a:r>
+                      <a:r>
+                        <a:rPr lang="en-US" sz="1200" dirty="0"/>
+                        <a:t> from the </a:t>
+                      </a:r>
+                      <a:r>
+                        <a:rPr lang="en-US" sz="1200" dirty="0" err="1"/>
+                        <a:t>url</a:t>
                       </a:r>
                       <a:endParaRPr lang="he-IL" sz="1200" dirty="0"/>
                     </a:p>
@@ -6912,7 +6967,7 @@
                       <a:pPr algn="l" rtl="0"/>
                       <a:r>
                         <a:rPr lang="en-US" sz="1200" dirty="0"/>
-                        <a:t>A form to add a recipe</a:t>
+                        <a:t>A form to add a recipe when the user is login</a:t>
                       </a:r>
                       <a:endParaRPr lang="he-IL" sz="1200" dirty="0"/>
                     </a:p>
@@ -7054,7 +7109,14 @@
                       </a:r>
                       <a:r>
                         <a:rPr lang="en-US" sz="1200" dirty="0"/>
-                        <a:t> to sign in / up</a:t>
+                        <a:t> to sign in / up,</a:t>
+                      </a:r>
+                    </a:p>
+                    <a:p>
+                      <a:pPr algn="l" rtl="0"/>
+                      <a:r>
+                        <a:rPr lang="en-US" sz="1200" dirty="0"/>
+                        <a:t>(When the user is not logged in, Shows two buttons. As soon as the user clicks, he goes to the system login component.)</a:t>
                       </a:r>
                       <a:endParaRPr lang="he-IL" sz="1200" dirty="0"/>
                     </a:p>
@@ -7762,7 +7824,7 @@
                       <a:pPr algn="l" rtl="0"/>
                       <a:r>
                         <a:rPr lang="en-US" sz="1200" dirty="0" err="1"/>
-                        <a:t>setUpdatre</a:t>
+                        <a:t>setUpdate</a:t>
                       </a:r>
                       <a:r>
                         <a:rPr lang="en-US" sz="1200" dirty="0"/>

</xml_diff>